<commit_message>
Atualiza apresentações websockets e xmpp
</commit_message>
<xml_diff>
--- a/projects/03-xmpp/xmpp.pptx
+++ b/projects/03-xmpp/xmpp.pptx
@@ -5,7 +5,7 @@
     <p:sldMasterId id="2147484007" r:id="rId1"/>
   </p:sldMasterIdLst>
   <p:notesMasterIdLst>
-    <p:notesMasterId r:id="rId22"/>
+    <p:notesMasterId r:id="rId23"/>
   </p:notesMasterIdLst>
   <p:sldIdLst>
     <p:sldId id="266" r:id="rId2"/>
@@ -27,7 +27,8 @@
     <p:sldId id="295" r:id="rId18"/>
     <p:sldId id="296" r:id="rId19"/>
     <p:sldId id="297" r:id="rId20"/>
-    <p:sldId id="281" r:id="rId21"/>
+    <p:sldId id="299" r:id="rId21"/>
+    <p:sldId id="281" r:id="rId22"/>
   </p:sldIdLst>
   <p:sldSz cx="12192000" cy="6858000"/>
   <p:notesSz cx="6858000" cy="9144000"/>
@@ -216,7 +217,7 @@
           <a:p>
             <a:fld id="{7497B6E1-7C5B-524D-B5EB-5E6695205380}" type="datetimeFigureOut">
               <a:rPr lang="pt-BR" smtClean="0"/>
-              <a:t>10/04/2019</a:t>
+              <a:t>30/04/2019</a:t>
             </a:fld>
             <a:endParaRPr lang="pt-BR" dirty="0"/>
           </a:p>
@@ -654,7 +655,7 @@
           <a:p>
             <a:fld id="{19E7D63B-43B5-8A4C-BD12-76889BE136BD}" type="datetime1">
               <a:rPr lang="en-US" smtClean="0"/>
-              <a:t>4/10/19</a:t>
+              <a:t>4/30/19</a:t>
             </a:fld>
             <a:endParaRPr lang="en-US" dirty="0"/>
           </a:p>
@@ -920,7 +921,7 @@
           <a:p>
             <a:fld id="{124E9894-F119-A64C-B7CB-D7CE860A73BE}" type="datetime1">
               <a:rPr lang="en-US" smtClean="0"/>
-              <a:t>4/10/19</a:t>
+              <a:t>4/30/19</a:t>
             </a:fld>
             <a:endParaRPr lang="en-US" dirty="0"/>
           </a:p>
@@ -1152,7 +1153,7 @@
           <a:p>
             <a:fld id="{124E9894-F119-A64C-B7CB-D7CE860A73BE}" type="datetime1">
               <a:rPr lang="en-US" smtClean="0"/>
-              <a:t>4/10/19</a:t>
+              <a:t>4/30/19</a:t>
             </a:fld>
             <a:endParaRPr lang="en-US" dirty="0"/>
           </a:p>
@@ -1463,7 +1464,7 @@
           <a:p>
             <a:fld id="{124E9894-F119-A64C-B7CB-D7CE860A73BE}" type="datetime1">
               <a:rPr lang="en-US" smtClean="0"/>
-              <a:t>4/10/19</a:t>
+              <a:t>4/30/19</a:t>
             </a:fld>
             <a:endParaRPr lang="en-US" dirty="0"/>
           </a:p>
@@ -1937,7 +1938,7 @@
           <a:p>
             <a:fld id="{B4BBB50B-BAA3-9748-978F-08A7877AB7D9}" type="datetime1">
               <a:rPr lang="en-US" smtClean="0"/>
-              <a:t>4/10/19</a:t>
+              <a:t>4/30/19</a:t>
             </a:fld>
             <a:endParaRPr lang="en-US" dirty="0"/>
           </a:p>
@@ -2484,7 +2485,7 @@
           <a:p>
             <a:fld id="{124E9894-F119-A64C-B7CB-D7CE860A73BE}" type="datetime1">
               <a:rPr lang="en-US" smtClean="0"/>
-              <a:t>4/10/19</a:t>
+              <a:t>4/30/19</a:t>
             </a:fld>
             <a:endParaRPr lang="en-US" dirty="0"/>
           </a:p>
@@ -3256,7 +3257,7 @@
           <a:p>
             <a:fld id="{124E9894-F119-A64C-B7CB-D7CE860A73BE}" type="datetime1">
               <a:rPr lang="en-US" smtClean="0"/>
-              <a:t>4/10/19</a:t>
+              <a:t>4/30/19</a:t>
             </a:fld>
             <a:endParaRPr lang="en-US" dirty="0"/>
           </a:p>
@@ -3432,7 +3433,7 @@
           <a:p>
             <a:fld id="{45040DEA-CE02-EF42-8F10-34F709D8505D}" type="datetime1">
               <a:rPr lang="en-US" smtClean="0"/>
-              <a:t>4/10/19</a:t>
+              <a:t>4/30/19</a:t>
             </a:fld>
             <a:endParaRPr lang="en-US" dirty="0"/>
           </a:p>
@@ -3655,7 +3656,7 @@
           <a:p>
             <a:fld id="{A0C1C801-5706-434E-AB65-DDFBCF1F55D2}" type="datetime1">
               <a:rPr lang="en-US" smtClean="0"/>
-              <a:t>4/10/19</a:t>
+              <a:t>4/30/19</a:t>
             </a:fld>
             <a:endParaRPr lang="en-US" dirty="0"/>
           </a:p>
@@ -3835,7 +3836,7 @@
           <a:p>
             <a:fld id="{39AE0FD8-7D7B-EA4F-8AF8-8B97820A0C5D}" type="datetime1">
               <a:rPr lang="en-US" smtClean="0"/>
-              <a:t>4/10/19</a:t>
+              <a:t>4/30/19</a:t>
             </a:fld>
             <a:endParaRPr lang="en-US" dirty="0"/>
           </a:p>
@@ -4124,7 +4125,7 @@
           <a:p>
             <a:fld id="{7FC94D43-3F68-DC43-8EF0-95FB3D51CCCF}" type="datetime1">
               <a:rPr lang="en-US" smtClean="0"/>
-              <a:t>4/10/19</a:t>
+              <a:t>4/30/19</a:t>
             </a:fld>
             <a:endParaRPr lang="en-US" dirty="0"/>
           </a:p>
@@ -4366,7 +4367,7 @@
           <a:p>
             <a:fld id="{BD42CFC2-1CE8-9045-8C9C-0F183F0FB455}" type="datetime1">
               <a:rPr lang="en-US" smtClean="0"/>
-              <a:t>4/10/19</a:t>
+              <a:t>4/30/19</a:t>
             </a:fld>
             <a:endParaRPr lang="en-US" dirty="0"/>
           </a:p>
@@ -4745,7 +4746,7 @@
           <a:p>
             <a:fld id="{F1B5C6E2-D044-C748-9C41-86C9B2F84EB9}" type="datetime1">
               <a:rPr lang="en-US" smtClean="0"/>
-              <a:t>4/10/19</a:t>
+              <a:t>4/30/19</a:t>
             </a:fld>
             <a:endParaRPr lang="en-US" dirty="0"/>
           </a:p>
@@ -4863,7 +4864,7 @@
           <a:p>
             <a:fld id="{359C32BA-C166-AC45-9FCD-8BF0F43629D9}" type="datetime1">
               <a:rPr lang="en-US" smtClean="0"/>
-              <a:t>4/10/19</a:t>
+              <a:t>4/30/19</a:t>
             </a:fld>
             <a:endParaRPr lang="en-US" dirty="0"/>
           </a:p>
@@ -4958,7 +4959,7 @@
           <a:p>
             <a:fld id="{E5D0D591-4B92-A44B-A0EA-798E76AD0368}" type="datetime1">
               <a:rPr lang="en-US" smtClean="0"/>
-              <a:t>4/10/19</a:t>
+              <a:t>4/30/19</a:t>
             </a:fld>
             <a:endParaRPr lang="en-US" dirty="0"/>
           </a:p>
@@ -5207,7 +5208,7 @@
           <a:p>
             <a:fld id="{8201F472-E17F-4B47-A44B-A2249FA27ED2}" type="datetime1">
               <a:rPr lang="en-US" smtClean="0"/>
-              <a:t>4/10/19</a:t>
+              <a:t>4/30/19</a:t>
             </a:fld>
             <a:endParaRPr lang="en-US" dirty="0"/>
           </a:p>
@@ -5463,7 +5464,7 @@
           <a:p>
             <a:fld id="{8BEFB9EE-CDF2-6F49-80F4-278D1604F10C}" type="datetime1">
               <a:rPr lang="en-US" smtClean="0"/>
-              <a:t>4/10/19</a:t>
+              <a:t>4/30/19</a:t>
             </a:fld>
             <a:endParaRPr lang="en-US" dirty="0"/>
           </a:p>
@@ -5706,7 +5707,7 @@
           <a:p>
             <a:fld id="{124E9894-F119-A64C-B7CB-D7CE860A73BE}" type="datetime1">
               <a:rPr lang="en-US" smtClean="0"/>
-              <a:t>4/10/19</a:t>
+              <a:t>4/30/19</a:t>
             </a:fld>
             <a:endParaRPr lang="en-US" dirty="0"/>
           </a:p>
@@ -9893,13 +9894,40 @@
           <a:p>
             <a:r>
               <a:rPr lang="pt-BR" sz="2800" dirty="0"/>
-              <a:t>O cliente comumente apenas acessa recursos em diferentes serviços (como páginas adicionais, arquivos js e css, etc.)</a:t>
+              <a:t>Normalmente não há cooperação entre servidores como ocorre na rede XMPP</a:t>
             </a:r>
           </a:p>
           <a:p>
             <a:r>
               <a:rPr lang="pt-BR" sz="2800" dirty="0"/>
-              <a:t>Mas normalmente não há qualquer cooperação (comunicação) entre servidores como ocorre na rede XMPP</a:t>
+              <a:t>O cliente comumente apenas acessa recursos em diferentes serviços (como páginas adicionais, arquivos </a:t>
+            </a:r>
+            <a:r>
+              <a:rPr lang="pt-BR" sz="2800" dirty="0" err="1"/>
+              <a:t>js</a:t>
+            </a:r>
+            <a:r>
+              <a:rPr lang="pt-BR" sz="2800" dirty="0"/>
+              <a:t> e </a:t>
+            </a:r>
+            <a:r>
+              <a:rPr lang="pt-BR" sz="2800" dirty="0" err="1"/>
+              <a:t>css</a:t>
+            </a:r>
+            <a:r>
+              <a:rPr lang="pt-BR" sz="2800" dirty="0"/>
+              <a:t>, etc.)</a:t>
+            </a:r>
+            <a:endParaRPr lang="pt-BR" sz="2800" b="1" dirty="0"/>
+          </a:p>
+          <a:p>
+            <a:r>
+              <a:rPr lang="pt-BR" sz="2800" dirty="0"/>
+              <a:t>Colaboração é ajuda </a:t>
+            </a:r>
+            <a:r>
+              <a:rPr lang="pt-BR" sz="2800" b="1" dirty="0"/>
+              <a:t>mútua</a:t>
             </a:r>
           </a:p>
         </p:txBody>
@@ -10767,57 +10795,14 @@
                             </p:stCondLst>
                             <p:childTnLst>
                               <p:par>
-                                <p:cTn id="21" presetID="9" presetClass="exit" presetSubtype="0" fill="hold" grpId="1" nodeType="clickEffect">
-                                  <p:stCondLst>
-                                    <p:cond delay="0"/>
-                                  </p:stCondLst>
-                                  <p:childTnLst>
-                                    <p:animEffect transition="out" filter="dissolve">
-                                      <p:cBhvr>
-                                        <p:cTn id="22" dur="500"/>
-                                        <p:tgtEl>
-                                          <p:spTgt spid="66">
-                                            <p:txEl>
-                                              <p:pRg st="1" end="1"/>
-                                            </p:txEl>
-                                          </p:spTgt>
-                                        </p:tgtEl>
-                                      </p:cBhvr>
-                                    </p:animEffect>
-                                    <p:set>
-                                      <p:cBhvr>
-                                        <p:cTn id="23" dur="1" fill="hold">
-                                          <p:stCondLst>
-                                            <p:cond delay="499"/>
-                                          </p:stCondLst>
-                                        </p:cTn>
-                                        <p:tgtEl>
-                                          <p:spTgt spid="66">
-                                            <p:txEl>
-                                              <p:pRg st="1" end="1"/>
-                                            </p:txEl>
-                                          </p:spTgt>
-                                        </p:tgtEl>
-                                        <p:attrNameLst>
-                                          <p:attrName>style.visibility</p:attrName>
-                                        </p:attrNameLst>
-                                      </p:cBhvr>
-                                      <p:to>
-                                        <p:strVal val="hidden"/>
-                                      </p:to>
-                                    </p:set>
-                                  </p:childTnLst>
-                                </p:cTn>
-                              </p:par>
-                              <p:par>
-                                <p:cTn id="24" presetID="9" presetClass="entr" presetSubtype="0" fill="hold" grpId="0" nodeType="withEffect">
+                                <p:cTn id="21" presetID="9" presetClass="entr" presetSubtype="0" fill="hold" grpId="0" nodeType="clickEffect">
                                   <p:stCondLst>
                                     <p:cond delay="0"/>
                                   </p:stCondLst>
                                   <p:childTnLst>
                                     <p:set>
                                       <p:cBhvr>
-                                        <p:cTn id="25" dur="1" fill="hold">
+                                        <p:cTn id="22" dur="1" fill="hold">
                                           <p:stCondLst>
                                             <p:cond delay="0"/>
                                           </p:stCondLst>
@@ -10839,11 +10824,72 @@
                                     </p:set>
                                     <p:animEffect transition="in" filter="dissolve">
                                       <p:cBhvr>
-                                        <p:cTn id="26" dur="500"/>
+                                        <p:cTn id="23" dur="500"/>
                                         <p:tgtEl>
                                           <p:spTgt spid="66">
                                             <p:txEl>
                                               <p:pRg st="2" end="2"/>
+                                            </p:txEl>
+                                          </p:spTgt>
+                                        </p:tgtEl>
+                                      </p:cBhvr>
+                                    </p:animEffect>
+                                  </p:childTnLst>
+                                </p:cTn>
+                              </p:par>
+                            </p:childTnLst>
+                          </p:cTn>
+                        </p:par>
+                      </p:childTnLst>
+                    </p:cTn>
+                  </p:par>
+                  <p:par>
+                    <p:cTn id="24" fill="hold">
+                      <p:stCondLst>
+                        <p:cond delay="indefinite"/>
+                      </p:stCondLst>
+                      <p:childTnLst>
+                        <p:par>
+                          <p:cTn id="25" fill="hold">
+                            <p:stCondLst>
+                              <p:cond delay="0"/>
+                            </p:stCondLst>
+                            <p:childTnLst>
+                              <p:par>
+                                <p:cTn id="26" presetID="9" presetClass="entr" presetSubtype="0" fill="hold" grpId="0" nodeType="clickEffect">
+                                  <p:stCondLst>
+                                    <p:cond delay="0"/>
+                                  </p:stCondLst>
+                                  <p:childTnLst>
+                                    <p:set>
+                                      <p:cBhvr>
+                                        <p:cTn id="27" dur="1" fill="hold">
+                                          <p:stCondLst>
+                                            <p:cond delay="0"/>
+                                          </p:stCondLst>
+                                        </p:cTn>
+                                        <p:tgtEl>
+                                          <p:spTgt spid="66">
+                                            <p:txEl>
+                                              <p:pRg st="3" end="3"/>
+                                            </p:txEl>
+                                          </p:spTgt>
+                                        </p:tgtEl>
+                                        <p:attrNameLst>
+                                          <p:attrName>style.visibility</p:attrName>
+                                        </p:attrNameLst>
+                                      </p:cBhvr>
+                                      <p:to>
+                                        <p:strVal val="visible"/>
+                                      </p:to>
+                                    </p:set>
+                                    <p:animEffect transition="in" filter="dissolve">
+                                      <p:cBhvr>
+                                        <p:cTn id="28" dur="500"/>
+                                        <p:tgtEl>
+                                          <p:spTgt spid="66">
+                                            <p:txEl>
+                                              <p:pRg st="3" end="3"/>
                                             </p:txEl>
                                           </p:spTgt>
                                         </p:tgtEl>
@@ -12197,7 +12243,7 @@
             <p:ph idx="1"/>
             <p:extLst>
               <p:ext uri="{D42A27DB-BD31-4B8C-83A1-F6EECF244321}">
-                <p14:modId xmlns:p14="http://schemas.microsoft.com/office/powerpoint/2010/main" val="451095549"/>
+                <p14:modId xmlns:p14="http://schemas.microsoft.com/office/powerpoint/2010/main" val="4056043790"/>
               </p:ext>
             </p:extLst>
           </p:nvPr>
@@ -12374,7 +12420,7 @@
                     <a:p>
                       <a:r>
                         <a:rPr lang="pt-BR" sz="2800" dirty="0"/>
-                        <a:t>Número de saltos para entrega de mensagens</a:t>
+                        <a:t>Número de saltos (hops) para entrega de mensagens</a:t>
                       </a:r>
                     </a:p>
                   </a:txBody>
@@ -12501,6 +12547,42 @@
           </a:p>
         </p:txBody>
       </p:sp>
+      <p:sp>
+        <p:nvSpPr>
+          <p:cNvPr id="4" name="TextBox 3">
+            <a:extLst>
+              <a:ext uri="{FF2B5EF4-FFF2-40B4-BE49-F238E27FC236}">
+                <a16:creationId xmlns:a16="http://schemas.microsoft.com/office/drawing/2014/main" id="{6BA22134-5572-684E-B751-0C74D9C2EE53}"/>
+              </a:ext>
+            </a:extLst>
+          </p:cNvPr>
+          <p:cNvSpPr txBox="1"/>
+          <p:nvPr/>
+        </p:nvSpPr>
+        <p:spPr>
+          <a:xfrm>
+            <a:off x="1215830" y="5679933"/>
+            <a:ext cx="10464724" cy="584775"/>
+          </a:xfrm>
+          <a:prstGeom prst="rect">
+            <a:avLst/>
+          </a:prstGeom>
+          <a:noFill/>
+        </p:spPr>
+        <p:txBody>
+          <a:bodyPr wrap="none" rtlCol="0">
+            <a:spAutoFit/>
+          </a:bodyPr>
+          <a:lstStyle/>
+          <a:p>
+            <a:pPr algn="ctr"/>
+            <a:r>
+              <a:rPr lang="pt-BR" sz="3200" dirty="0"/>
+              <a:t>Saltos (hops) é o número de servidores acessados</a:t>
+            </a:r>
+          </a:p>
+        </p:txBody>
+      </p:sp>
     </p:spTree>
     <p:extLst>
       <p:ext uri="{BB962C8B-B14F-4D97-AF65-F5344CB8AC3E}">
@@ -12643,7 +12725,7 @@
         <p:spPr>
           <a:xfrm>
             <a:off x="213595" y="1926427"/>
-            <a:ext cx="9109564" cy="3964707"/>
+            <a:ext cx="9109564" cy="4706385"/>
           </a:xfrm>
         </p:spPr>
         <p:txBody>
@@ -12677,6 +12759,12 @@
             <a:r>
               <a:rPr lang="pt-BR" sz="2800" dirty="0"/>
               <a:t>Isto torna a comunicação mais rápida (por remover intermediários) e evita sobrecarga do servidor</a:t>
+            </a:r>
+          </a:p>
+          <a:p>
+            <a:r>
+              <a:rPr lang="pt-BR" sz="2800" dirty="0"/>
+              <a:t>O WhatsApp possivelmente usa tal recurso para voz e vídeo. </a:t>
             </a:r>
           </a:p>
         </p:txBody>
@@ -13351,6 +13439,67 @@
                                           <p:spTgt spid="66">
                                             <p:txEl>
                                               <p:pRg st="2" end="2"/>
+                                            </p:txEl>
+                                          </p:spTgt>
+                                        </p:tgtEl>
+                                      </p:cBhvr>
+                                    </p:animEffect>
+                                  </p:childTnLst>
+                                </p:cTn>
+                              </p:par>
+                            </p:childTnLst>
+                          </p:cTn>
+                        </p:par>
+                      </p:childTnLst>
+                    </p:cTn>
+                  </p:par>
+                  <p:par>
+                    <p:cTn id="27" fill="hold">
+                      <p:stCondLst>
+                        <p:cond delay="indefinite"/>
+                      </p:stCondLst>
+                      <p:childTnLst>
+                        <p:par>
+                          <p:cTn id="28" fill="hold">
+                            <p:stCondLst>
+                              <p:cond delay="0"/>
+                            </p:stCondLst>
+                            <p:childTnLst>
+                              <p:par>
+                                <p:cTn id="29" presetID="9" presetClass="entr" presetSubtype="0" fill="hold" grpId="0" nodeType="clickEffect">
+                                  <p:stCondLst>
+                                    <p:cond delay="0"/>
+                                  </p:stCondLst>
+                                  <p:childTnLst>
+                                    <p:set>
+                                      <p:cBhvr>
+                                        <p:cTn id="30" dur="1" fill="hold">
+                                          <p:stCondLst>
+                                            <p:cond delay="0"/>
+                                          </p:stCondLst>
+                                        </p:cTn>
+                                        <p:tgtEl>
+                                          <p:spTgt spid="66">
+                                            <p:txEl>
+                                              <p:pRg st="3" end="3"/>
+                                            </p:txEl>
+                                          </p:spTgt>
+                                        </p:tgtEl>
+                                        <p:attrNameLst>
+                                          <p:attrName>style.visibility</p:attrName>
+                                        </p:attrNameLst>
+                                      </p:cBhvr>
+                                      <p:to>
+                                        <p:strVal val="visible"/>
+                                      </p:to>
+                                    </p:set>
+                                    <p:animEffect transition="in" filter="dissolve">
+                                      <p:cBhvr>
+                                        <p:cTn id="31" dur="500"/>
+                                        <p:tgtEl>
+                                          <p:spTgt spid="66">
+                                            <p:txEl>
+                                              <p:pRg st="3" end="3"/>
                                             </p:txEl>
                                           </p:spTgt>
                                         </p:tgtEl>
@@ -14841,6 +14990,995 @@
       </p:grpSpPr>
       <p:sp>
         <p:nvSpPr>
+          <p:cNvPr id="2" name="Title 1">
+            <a:extLst>
+              <a:ext uri="{FF2B5EF4-FFF2-40B4-BE49-F238E27FC236}">
+                <a16:creationId xmlns:a16="http://schemas.microsoft.com/office/drawing/2014/main" id="{58204B45-BA2F-544A-ADBD-2B584480C63E}"/>
+              </a:ext>
+            </a:extLst>
+          </p:cNvPr>
+          <p:cNvSpPr>
+            <a:spLocks noGrp="1"/>
+          </p:cNvSpPr>
+          <p:nvPr>
+            <p:ph type="title"/>
+          </p:nvPr>
+        </p:nvSpPr>
+        <p:spPr>
+          <a:xfrm>
+            <a:off x="1861473" y="365037"/>
+            <a:ext cx="8589364" cy="1005811"/>
+          </a:xfrm>
+        </p:spPr>
+        <p:txBody>
+          <a:bodyPr>
+            <a:normAutofit/>
+          </a:bodyPr>
+          <a:lstStyle/>
+          <a:p>
+            <a:pPr algn="ctr"/>
+            <a:r>
+              <a:rPr lang="pt-BR" b="1" dirty="0">
+                <a:solidFill>
+                  <a:schemeClr val="bg1"/>
+                </a:solidFill>
+                <a:effectLst>
+                  <a:outerShdw blurRad="228600" dist="50800" dir="5400000" algn="ctr" rotWithShape="0">
+                    <a:schemeClr val="tx1"/>
+                  </a:outerShdw>
+                </a:effectLst>
+              </a:rPr>
+              <a:t>segurança</a:t>
+            </a:r>
+            <a:endParaRPr lang="pt-BR" dirty="0">
+              <a:solidFill>
+                <a:schemeClr val="bg1"/>
+              </a:solidFill>
+              <a:effectLst>
+                <a:outerShdw blurRad="228600" dist="50800" dir="5400000" algn="ctr" rotWithShape="0">
+                  <a:schemeClr val="tx1"/>
+                </a:outerShdw>
+              </a:effectLst>
+            </a:endParaRPr>
+          </a:p>
+        </p:txBody>
+      </p:sp>
+      <p:sp>
+        <p:nvSpPr>
+          <p:cNvPr id="66" name="Content Placeholder 2">
+            <a:extLst>
+              <a:ext uri="{FF2B5EF4-FFF2-40B4-BE49-F238E27FC236}">
+                <a16:creationId xmlns:a16="http://schemas.microsoft.com/office/drawing/2014/main" id="{7DD7200E-83C5-FE41-A371-CC6A4884910F}"/>
+              </a:ext>
+            </a:extLst>
+          </p:cNvPr>
+          <p:cNvSpPr>
+            <a:spLocks noGrp="1"/>
+          </p:cNvSpPr>
+          <p:nvPr>
+            <p:ph idx="1"/>
+          </p:nvPr>
+        </p:nvSpPr>
+        <p:spPr>
+          <a:xfrm>
+            <a:off x="393475" y="1978703"/>
+            <a:ext cx="8779778" cy="4721898"/>
+          </a:xfrm>
+        </p:spPr>
+        <p:txBody>
+          <a:bodyPr>
+            <a:normAutofit/>
+          </a:bodyPr>
+          <a:lstStyle/>
+          <a:p>
+            <a:r>
+              <a:rPr lang="pt-BR" sz="2800" dirty="0"/>
+              <a:t>A comunicação pode ser criptografada fim-a-fim</a:t>
+            </a:r>
+          </a:p>
+          <a:p>
+            <a:r>
+              <a:rPr lang="pt-BR" sz="2800" dirty="0"/>
+              <a:t>Neste caso, somente o emissor e receptor podem </a:t>
+            </a:r>
+            <a:r>
+              <a:rPr lang="pt-BR" sz="2800" dirty="0" err="1"/>
+              <a:t>descriptografar</a:t>
+            </a:r>
+            <a:endParaRPr lang="pt-BR" sz="2800" dirty="0"/>
+          </a:p>
+          <a:p>
+            <a:r>
+              <a:rPr lang="pt-BR" sz="2800" dirty="0"/>
+              <a:t>O WhatsApp utiliza tal recurso, sendo que nem mesmo a empresa pode ler as </a:t>
+            </a:r>
+            <a:r>
+              <a:rPr lang="pt-BR" sz="2800" dirty="0" err="1"/>
+              <a:t>msgs</a:t>
+            </a:r>
+            <a:r>
+              <a:rPr lang="pt-BR" sz="2800" dirty="0"/>
+              <a:t> dos usuários </a:t>
+            </a:r>
+            <a:r>
+              <a:rPr lang="pt-BR" sz="2800" dirty="0">
+                <a:hlinkClick r:id="rId2"/>
+              </a:rPr>
+              <a:t>https://youtu.be/8PW3O2mqTn8</a:t>
+            </a:r>
+            <a:r>
+              <a:rPr lang="pt-BR" sz="2800" dirty="0"/>
+              <a:t> </a:t>
+            </a:r>
+          </a:p>
+        </p:txBody>
+      </p:sp>
+      <p:sp>
+        <p:nvSpPr>
+          <p:cNvPr id="3" name="Slide Number Placeholder 2">
+            <a:extLst>
+              <a:ext uri="{FF2B5EF4-FFF2-40B4-BE49-F238E27FC236}">
+                <a16:creationId xmlns:a16="http://schemas.microsoft.com/office/drawing/2014/main" id="{E8782EBD-1415-0F4A-9755-9CBACA835A18}"/>
+              </a:ext>
+            </a:extLst>
+          </p:cNvPr>
+          <p:cNvSpPr>
+            <a:spLocks noGrp="1"/>
+          </p:cNvSpPr>
+          <p:nvPr>
+            <p:ph type="sldNum" sz="quarter" idx="12"/>
+          </p:nvPr>
+        </p:nvSpPr>
+        <p:spPr/>
+        <p:txBody>
+          <a:bodyPr/>
+          <a:lstStyle/>
+          <a:p>
+            <a:fld id="{2183B7EE-0FBE-B749-875F-ED24F5ECD71F}" type="slidenum">
+              <a:rPr lang="en-US" smtClean="0"/>
+              <a:t>20</a:t>
+            </a:fld>
+            <a:endParaRPr lang="en-US" dirty="0"/>
+          </a:p>
+        </p:txBody>
+      </p:sp>
+      <p:grpSp>
+        <p:nvGrpSpPr>
+          <p:cNvPr id="11" name="Group 10">
+            <a:extLst>
+              <a:ext uri="{FF2B5EF4-FFF2-40B4-BE49-F238E27FC236}">
+                <a16:creationId xmlns:a16="http://schemas.microsoft.com/office/drawing/2014/main" id="{30227624-EE6B-4541-8524-0E247FB476DD}"/>
+              </a:ext>
+            </a:extLst>
+          </p:cNvPr>
+          <p:cNvGrpSpPr/>
+          <p:nvPr/>
+        </p:nvGrpSpPr>
+        <p:grpSpPr>
+          <a:xfrm>
+            <a:off x="9466457" y="1823456"/>
+            <a:ext cx="2601994" cy="4373089"/>
+            <a:chOff x="9451467" y="2228188"/>
+            <a:chExt cx="2601994" cy="4373089"/>
+          </a:xfrm>
+        </p:grpSpPr>
+        <p:pic>
+          <p:nvPicPr>
+            <p:cNvPr id="12" name="Picture 11" descr="An open computer sitting on a table&#13;&#10;&#13;&#10;Description automatically generated">
+              <a:extLst>
+                <a:ext uri="{FF2B5EF4-FFF2-40B4-BE49-F238E27FC236}">
+                  <a16:creationId xmlns:a16="http://schemas.microsoft.com/office/drawing/2014/main" id="{ABFDDB4A-2D68-3146-AC99-F90C4FE4CD7D}"/>
+                </a:ext>
+              </a:extLst>
+            </p:cNvPr>
+            <p:cNvPicPr>
+              <a:picLocks noChangeAspect="1"/>
+            </p:cNvPicPr>
+            <p:nvPr/>
+          </p:nvPicPr>
+          <p:blipFill>
+            <a:blip r:embed="rId3"/>
+            <a:stretch>
+              <a:fillRect/>
+            </a:stretch>
+          </p:blipFill>
+          <p:spPr>
+            <a:xfrm>
+              <a:off x="10403734" y="5672758"/>
+              <a:ext cx="671808" cy="516876"/>
+            </a:xfrm>
+            <a:prstGeom prst="rect">
+              <a:avLst/>
+            </a:prstGeom>
+          </p:spPr>
+        </p:pic>
+        <p:pic>
+          <p:nvPicPr>
+            <p:cNvPr id="13" name="Picture 12" descr="Screen of a cell phone&#13;&#10;&#13;&#10;Description automatically generated">
+              <a:extLst>
+                <a:ext uri="{FF2B5EF4-FFF2-40B4-BE49-F238E27FC236}">
+                  <a16:creationId xmlns:a16="http://schemas.microsoft.com/office/drawing/2014/main" id="{0046F209-F0F7-7749-BD16-20D9EE597AE3}"/>
+                </a:ext>
+              </a:extLst>
+            </p:cNvPr>
+            <p:cNvPicPr>
+              <a:picLocks noChangeAspect="1"/>
+            </p:cNvPicPr>
+            <p:nvPr/>
+          </p:nvPicPr>
+          <p:blipFill>
+            <a:blip r:embed="rId4"/>
+            <a:stretch>
+              <a:fillRect/>
+            </a:stretch>
+          </p:blipFill>
+          <p:spPr>
+            <a:xfrm>
+              <a:off x="10616173" y="2228188"/>
+              <a:ext cx="180695" cy="361393"/>
+            </a:xfrm>
+            <a:prstGeom prst="rect">
+              <a:avLst/>
+            </a:prstGeom>
+          </p:spPr>
+        </p:pic>
+        <p:sp>
+          <p:nvSpPr>
+            <p:cNvPr id="14" name="TextBox 13">
+              <a:extLst>
+                <a:ext uri="{FF2B5EF4-FFF2-40B4-BE49-F238E27FC236}">
+                  <a16:creationId xmlns:a16="http://schemas.microsoft.com/office/drawing/2014/main" id="{BFF4F7B4-73EA-3B45-8EBE-497DB9631F24}"/>
+                </a:ext>
+              </a:extLst>
+            </p:cNvPr>
+            <p:cNvSpPr txBox="1"/>
+            <p:nvPr/>
+          </p:nvSpPr>
+          <p:spPr>
+            <a:xfrm>
+              <a:off x="9509178" y="2688873"/>
+              <a:ext cx="2460931" cy="369332"/>
+            </a:xfrm>
+            <a:prstGeom prst="rect">
+              <a:avLst/>
+            </a:prstGeom>
+            <a:noFill/>
+          </p:spPr>
+          <p:txBody>
+            <a:bodyPr vert="horz" wrap="none" rtlCol="0">
+              <a:spAutoFit/>
+            </a:bodyPr>
+            <a:lstStyle/>
+            <a:p>
+              <a:pPr algn="ctr"/>
+              <a:r>
+                <a:rPr lang="en-US" dirty="0"/>
+                <a:t>joão@servidor1.com</a:t>
+              </a:r>
+              <a:endParaRPr lang="pt-BR" sz="1600" b="1" dirty="0"/>
+            </a:p>
+          </p:txBody>
+        </p:sp>
+        <p:sp>
+          <p:nvSpPr>
+            <p:cNvPr id="15" name="TextBox 14">
+              <a:extLst>
+                <a:ext uri="{FF2B5EF4-FFF2-40B4-BE49-F238E27FC236}">
+                  <a16:creationId xmlns:a16="http://schemas.microsoft.com/office/drawing/2014/main" id="{F8A4B86C-554B-A540-87C7-70EFE90A29BD}"/>
+                </a:ext>
+              </a:extLst>
+            </p:cNvPr>
+            <p:cNvSpPr txBox="1"/>
+            <p:nvPr/>
+          </p:nvSpPr>
+          <p:spPr>
+            <a:xfrm>
+              <a:off x="9451467" y="6231945"/>
+              <a:ext cx="2601994" cy="369332"/>
+            </a:xfrm>
+            <a:prstGeom prst="rect">
+              <a:avLst/>
+            </a:prstGeom>
+            <a:noFill/>
+          </p:spPr>
+          <p:txBody>
+            <a:bodyPr vert="horz" wrap="none" rtlCol="0">
+              <a:spAutoFit/>
+            </a:bodyPr>
+            <a:lstStyle/>
+            <a:p>
+              <a:pPr algn="ctr"/>
+              <a:r>
+                <a:rPr lang="en-US" dirty="0"/>
+                <a:t>maria@servidor2.com</a:t>
+              </a:r>
+              <a:endParaRPr lang="pt-BR" sz="1600" b="1" dirty="0"/>
+            </a:p>
+          </p:txBody>
+        </p:sp>
+        <p:cxnSp>
+          <p:nvCxnSpPr>
+            <p:cNvPr id="16" name="Curved Connector 15">
+              <a:extLst>
+                <a:ext uri="{FF2B5EF4-FFF2-40B4-BE49-F238E27FC236}">
+                  <a16:creationId xmlns:a16="http://schemas.microsoft.com/office/drawing/2014/main" id="{2950E4E6-D813-EE41-9227-52A96521E923}"/>
+                </a:ext>
+              </a:extLst>
+            </p:cNvPr>
+            <p:cNvCxnSpPr>
+              <a:cxnSpLocks/>
+              <a:stCxn id="14" idx="2"/>
+              <a:endCxn id="12" idx="0"/>
+            </p:cNvCxnSpPr>
+            <p:nvPr/>
+          </p:nvCxnSpPr>
+          <p:spPr>
+            <a:xfrm rot="5400000">
+              <a:off x="9432365" y="4365478"/>
+              <a:ext cx="2614553" cy="6"/>
+            </a:xfrm>
+            <a:prstGeom prst="curvedConnector3">
+              <a:avLst>
+                <a:gd name="adj1" fmla="val 50000"/>
+              </a:avLst>
+            </a:prstGeom>
+            <a:ln w="34925">
+              <a:solidFill>
+                <a:srgbClr val="00B0F0"/>
+              </a:solidFill>
+              <a:headEnd type="triangle"/>
+              <a:tailEnd type="triangle"/>
+            </a:ln>
+          </p:spPr>
+          <p:style>
+            <a:lnRef idx="1">
+              <a:schemeClr val="accent1"/>
+            </a:lnRef>
+            <a:fillRef idx="0">
+              <a:schemeClr val="accent1"/>
+            </a:fillRef>
+            <a:effectRef idx="0">
+              <a:schemeClr val="accent1"/>
+            </a:effectRef>
+            <a:fontRef idx="minor">
+              <a:schemeClr val="tx1"/>
+            </a:fontRef>
+          </p:style>
+        </p:cxnSp>
+      </p:grpSp>
+      <p:grpSp>
+        <p:nvGrpSpPr>
+          <p:cNvPr id="17" name="Group 16">
+            <a:extLst>
+              <a:ext uri="{FF2B5EF4-FFF2-40B4-BE49-F238E27FC236}">
+                <a16:creationId xmlns:a16="http://schemas.microsoft.com/office/drawing/2014/main" id="{A0B742D1-489E-B046-9A79-9C35191862CB}"/>
+              </a:ext>
+            </a:extLst>
+          </p:cNvPr>
+          <p:cNvGrpSpPr/>
+          <p:nvPr/>
+        </p:nvGrpSpPr>
+        <p:grpSpPr>
+          <a:xfrm>
+            <a:off x="10190414" y="3396066"/>
+            <a:ext cx="1211351" cy="1088250"/>
+            <a:chOff x="10190414" y="3396066"/>
+            <a:chExt cx="1211351" cy="1088250"/>
+          </a:xfrm>
+        </p:grpSpPr>
+        <p:pic>
+          <p:nvPicPr>
+            <p:cNvPr id="18" name="Picture 17" descr="A close up of a logo&#10;&#10;Description automatically generated">
+              <a:extLst>
+                <a:ext uri="{FF2B5EF4-FFF2-40B4-BE49-F238E27FC236}">
+                  <a16:creationId xmlns:a16="http://schemas.microsoft.com/office/drawing/2014/main" id="{AA16C49B-6940-1E48-8F08-3B6EC0D24A54}"/>
+                </a:ext>
+              </a:extLst>
+            </p:cNvPr>
+            <p:cNvPicPr>
+              <a:picLocks noChangeAspect="1"/>
+            </p:cNvPicPr>
+            <p:nvPr/>
+          </p:nvPicPr>
+          <p:blipFill>
+            <a:blip r:embed="rId5">
+              <a:extLst>
+                <a:ext uri="{837473B0-CC2E-450A-ABE3-18F120FF3D39}">
+                  <a1611:picAttrSrcUrl xmlns:a1611="http://schemas.microsoft.com/office/drawing/2016/11/main" r:id="rId6"/>
+                </a:ext>
+              </a:extLst>
+            </a:blip>
+            <a:stretch>
+              <a:fillRect/>
+            </a:stretch>
+          </p:blipFill>
+          <p:spPr>
+            <a:xfrm>
+              <a:off x="10190414" y="3670162"/>
+              <a:ext cx="529386" cy="529386"/>
+            </a:xfrm>
+            <a:prstGeom prst="rect">
+              <a:avLst/>
+            </a:prstGeom>
+          </p:spPr>
+        </p:pic>
+        <p:pic>
+          <p:nvPicPr>
+            <p:cNvPr id="19" name="Picture 18">
+              <a:extLst>
+                <a:ext uri="{FF2B5EF4-FFF2-40B4-BE49-F238E27FC236}">
+                  <a16:creationId xmlns:a16="http://schemas.microsoft.com/office/drawing/2014/main" id="{064EA254-55CA-824B-8204-F6B3C19833D5}"/>
+                </a:ext>
+              </a:extLst>
+            </p:cNvPr>
+            <p:cNvPicPr>
+              <a:picLocks noChangeAspect="1"/>
+            </p:cNvPicPr>
+            <p:nvPr/>
+          </p:nvPicPr>
+          <p:blipFill>
+            <a:blip r:embed="rId7">
+              <a:extLst>
+                <a:ext uri="{837473B0-CC2E-450A-ABE3-18F120FF3D39}">
+                  <a1611:picAttrSrcUrl xmlns:a1611="http://schemas.microsoft.com/office/drawing/2016/11/main" r:id="rId8"/>
+                </a:ext>
+              </a:extLst>
+            </a:blip>
+            <a:stretch>
+              <a:fillRect/>
+            </a:stretch>
+          </p:blipFill>
+          <p:spPr>
+            <a:xfrm>
+              <a:off x="10857629" y="3954972"/>
+              <a:ext cx="529344" cy="529344"/>
+            </a:xfrm>
+            <a:prstGeom prst="rect">
+              <a:avLst/>
+            </a:prstGeom>
+          </p:spPr>
+        </p:pic>
+        <p:pic>
+          <p:nvPicPr>
+            <p:cNvPr id="20" name="Picture 19">
+              <a:extLst>
+                <a:ext uri="{FF2B5EF4-FFF2-40B4-BE49-F238E27FC236}">
+                  <a16:creationId xmlns:a16="http://schemas.microsoft.com/office/drawing/2014/main" id="{AC05F15F-1717-0C42-9851-64EADD11E0C3}"/>
+                </a:ext>
+              </a:extLst>
+            </p:cNvPr>
+            <p:cNvPicPr>
+              <a:picLocks noChangeAspect="1"/>
+            </p:cNvPicPr>
+            <p:nvPr/>
+          </p:nvPicPr>
+          <p:blipFill>
+            <a:blip r:embed="rId9">
+              <a:extLst>
+                <a:ext uri="{837473B0-CC2E-450A-ABE3-18F120FF3D39}">
+                  <a1611:picAttrSrcUrl xmlns:a1611="http://schemas.microsoft.com/office/drawing/2016/11/main" r:id="rId10"/>
+                </a:ext>
+              </a:extLst>
+            </a:blip>
+            <a:stretch>
+              <a:fillRect/>
+            </a:stretch>
+          </p:blipFill>
+          <p:spPr>
+            <a:xfrm>
+              <a:off x="10872379" y="3396066"/>
+              <a:ext cx="529386" cy="529386"/>
+            </a:xfrm>
+            <a:prstGeom prst="rect">
+              <a:avLst/>
+            </a:prstGeom>
+          </p:spPr>
+        </p:pic>
+      </p:grpSp>
+      <p:pic>
+        <p:nvPicPr>
+          <p:cNvPr id="5" name="Picture 4" descr="A picture containing indoor, table, sitting, computer&#10;&#10;Description automatically generated">
+            <a:extLst>
+              <a:ext uri="{FF2B5EF4-FFF2-40B4-BE49-F238E27FC236}">
+                <a16:creationId xmlns:a16="http://schemas.microsoft.com/office/drawing/2014/main" id="{ACB4243A-2954-A04E-88FB-6F496147AF65}"/>
+              </a:ext>
+            </a:extLst>
+          </p:cNvPr>
+          <p:cNvPicPr>
+            <a:picLocks noChangeAspect="1"/>
+          </p:cNvPicPr>
+          <p:nvPr/>
+        </p:nvPicPr>
+        <p:blipFill>
+          <a:blip r:embed="rId11">
+            <a:extLst>
+              <a:ext uri="{837473B0-CC2E-450A-ABE3-18F120FF3D39}">
+                <a1611:picAttrSrcUrl xmlns:a1611="http://schemas.microsoft.com/office/drawing/2016/11/main" r:id="rId12"/>
+              </a:ext>
+            </a:extLst>
+          </a:blip>
+          <a:stretch>
+            <a:fillRect/>
+          </a:stretch>
+        </p:blipFill>
+        <p:spPr>
+          <a:xfrm>
+            <a:off x="10238366" y="2577927"/>
+            <a:ext cx="516262" cy="516262"/>
+          </a:xfrm>
+          <a:prstGeom prst="rect">
+            <a:avLst/>
+          </a:prstGeom>
+        </p:spPr>
+      </p:pic>
+      <p:pic>
+        <p:nvPicPr>
+          <p:cNvPr id="21" name="Picture 20" descr="A picture containing indoor, table, sitting, computer&#10;&#10;Description automatically generated">
+            <a:extLst>
+              <a:ext uri="{FF2B5EF4-FFF2-40B4-BE49-F238E27FC236}">
+                <a16:creationId xmlns:a16="http://schemas.microsoft.com/office/drawing/2014/main" id="{5A04AA45-20AD-5148-A90F-5DB29A1E25C4}"/>
+              </a:ext>
+            </a:extLst>
+          </p:cNvPr>
+          <p:cNvPicPr>
+            <a:picLocks noChangeAspect="1"/>
+          </p:cNvPicPr>
+          <p:nvPr/>
+        </p:nvPicPr>
+        <p:blipFill>
+          <a:blip r:embed="rId11">
+            <a:extLst>
+              <a:ext uri="{837473B0-CC2E-450A-ABE3-18F120FF3D39}">
+                <a1611:picAttrSrcUrl xmlns:a1611="http://schemas.microsoft.com/office/drawing/2016/11/main" r:id="rId12"/>
+              </a:ext>
+            </a:extLst>
+          </a:blip>
+          <a:stretch>
+            <a:fillRect/>
+          </a:stretch>
+        </p:blipFill>
+        <p:spPr>
+          <a:xfrm>
+            <a:off x="10202339" y="4614095"/>
+            <a:ext cx="516262" cy="516262"/>
+          </a:xfrm>
+          <a:prstGeom prst="rect">
+            <a:avLst/>
+          </a:prstGeom>
+        </p:spPr>
+      </p:pic>
+    </p:spTree>
+    <p:extLst>
+      <p:ext uri="{BB962C8B-B14F-4D97-AF65-F5344CB8AC3E}">
+        <p14:creationId xmlns:p14="http://schemas.microsoft.com/office/powerpoint/2010/main" val="1992295484"/>
+      </p:ext>
+    </p:extLst>
+  </p:cSld>
+  <p:clrMapOvr>
+    <a:masterClrMapping/>
+  </p:clrMapOvr>
+  <p:timing>
+    <p:tnLst>
+      <p:par>
+        <p:cTn id="1" dur="indefinite" restart="never" nodeType="tmRoot">
+          <p:childTnLst>
+            <p:seq concurrent="1" nextAc="seek">
+              <p:cTn id="2" dur="indefinite" nodeType="mainSeq">
+                <p:childTnLst>
+                  <p:par>
+                    <p:cTn id="3" fill="hold">
+                      <p:stCondLst>
+                        <p:cond delay="indefinite"/>
+                      </p:stCondLst>
+                      <p:childTnLst>
+                        <p:par>
+                          <p:cTn id="4" fill="hold">
+                            <p:stCondLst>
+                              <p:cond delay="0"/>
+                            </p:stCondLst>
+                            <p:childTnLst>
+                              <p:par>
+                                <p:cTn id="5" presetID="9" presetClass="entr" presetSubtype="0" fill="hold" grpId="0" nodeType="clickEffect">
+                                  <p:stCondLst>
+                                    <p:cond delay="0"/>
+                                  </p:stCondLst>
+                                  <p:childTnLst>
+                                    <p:set>
+                                      <p:cBhvr>
+                                        <p:cTn id="6" dur="1" fill="hold">
+                                          <p:stCondLst>
+                                            <p:cond delay="0"/>
+                                          </p:stCondLst>
+                                        </p:cTn>
+                                        <p:tgtEl>
+                                          <p:spTgt spid="66">
+                                            <p:txEl>
+                                              <p:pRg st="0" end="0"/>
+                                            </p:txEl>
+                                          </p:spTgt>
+                                        </p:tgtEl>
+                                        <p:attrNameLst>
+                                          <p:attrName>style.visibility</p:attrName>
+                                        </p:attrNameLst>
+                                      </p:cBhvr>
+                                      <p:to>
+                                        <p:strVal val="visible"/>
+                                      </p:to>
+                                    </p:set>
+                                    <p:animEffect transition="in" filter="dissolve">
+                                      <p:cBhvr>
+                                        <p:cTn id="7" dur="500"/>
+                                        <p:tgtEl>
+                                          <p:spTgt spid="66">
+                                            <p:txEl>
+                                              <p:pRg st="0" end="0"/>
+                                            </p:txEl>
+                                          </p:spTgt>
+                                        </p:tgtEl>
+                                      </p:cBhvr>
+                                    </p:animEffect>
+                                  </p:childTnLst>
+                                </p:cTn>
+                              </p:par>
+                            </p:childTnLst>
+                          </p:cTn>
+                        </p:par>
+                      </p:childTnLst>
+                    </p:cTn>
+                  </p:par>
+                  <p:par>
+                    <p:cTn id="8" fill="hold">
+                      <p:stCondLst>
+                        <p:cond delay="indefinite"/>
+                      </p:stCondLst>
+                      <p:childTnLst>
+                        <p:par>
+                          <p:cTn id="9" fill="hold">
+                            <p:stCondLst>
+                              <p:cond delay="0"/>
+                            </p:stCondLst>
+                            <p:childTnLst>
+                              <p:par>
+                                <p:cTn id="10" presetID="9" presetClass="entr" presetSubtype="0" fill="hold" grpId="0" nodeType="clickEffect">
+                                  <p:stCondLst>
+                                    <p:cond delay="0"/>
+                                  </p:stCondLst>
+                                  <p:childTnLst>
+                                    <p:set>
+                                      <p:cBhvr>
+                                        <p:cTn id="11" dur="1" fill="hold">
+                                          <p:stCondLst>
+                                            <p:cond delay="0"/>
+                                          </p:stCondLst>
+                                        </p:cTn>
+                                        <p:tgtEl>
+                                          <p:spTgt spid="66">
+                                            <p:txEl>
+                                              <p:pRg st="1" end="1"/>
+                                            </p:txEl>
+                                          </p:spTgt>
+                                        </p:tgtEl>
+                                        <p:attrNameLst>
+                                          <p:attrName>style.visibility</p:attrName>
+                                        </p:attrNameLst>
+                                      </p:cBhvr>
+                                      <p:to>
+                                        <p:strVal val="visible"/>
+                                      </p:to>
+                                    </p:set>
+                                    <p:animEffect transition="in" filter="dissolve">
+                                      <p:cBhvr>
+                                        <p:cTn id="12" dur="500"/>
+                                        <p:tgtEl>
+                                          <p:spTgt spid="66">
+                                            <p:txEl>
+                                              <p:pRg st="1" end="1"/>
+                                            </p:txEl>
+                                          </p:spTgt>
+                                        </p:tgtEl>
+                                      </p:cBhvr>
+                                    </p:animEffect>
+                                  </p:childTnLst>
+                                </p:cTn>
+                              </p:par>
+                            </p:childTnLst>
+                          </p:cTn>
+                        </p:par>
+                      </p:childTnLst>
+                    </p:cTn>
+                  </p:par>
+                  <p:par>
+                    <p:cTn id="13" fill="hold">
+                      <p:stCondLst>
+                        <p:cond delay="indefinite"/>
+                      </p:stCondLst>
+                      <p:childTnLst>
+                        <p:par>
+                          <p:cTn id="14" fill="hold">
+                            <p:stCondLst>
+                              <p:cond delay="0"/>
+                            </p:stCondLst>
+                            <p:childTnLst>
+                              <p:par>
+                                <p:cTn id="15" presetID="9" presetClass="entr" presetSubtype="0" fill="hold" grpId="0" nodeType="clickEffect">
+                                  <p:stCondLst>
+                                    <p:cond delay="0"/>
+                                  </p:stCondLst>
+                                  <p:childTnLst>
+                                    <p:set>
+                                      <p:cBhvr>
+                                        <p:cTn id="16" dur="1" fill="hold">
+                                          <p:stCondLst>
+                                            <p:cond delay="0"/>
+                                          </p:stCondLst>
+                                        </p:cTn>
+                                        <p:tgtEl>
+                                          <p:spTgt spid="66">
+                                            <p:txEl>
+                                              <p:pRg st="2" end="2"/>
+                                            </p:txEl>
+                                          </p:spTgt>
+                                        </p:tgtEl>
+                                        <p:attrNameLst>
+                                          <p:attrName>style.visibility</p:attrName>
+                                        </p:attrNameLst>
+                                      </p:cBhvr>
+                                      <p:to>
+                                        <p:strVal val="visible"/>
+                                      </p:to>
+                                    </p:set>
+                                    <p:animEffect transition="in" filter="dissolve">
+                                      <p:cBhvr>
+                                        <p:cTn id="17" dur="500"/>
+                                        <p:tgtEl>
+                                          <p:spTgt spid="66">
+                                            <p:txEl>
+                                              <p:pRg st="2" end="2"/>
+                                            </p:txEl>
+                                          </p:spTgt>
+                                        </p:tgtEl>
+                                      </p:cBhvr>
+                                    </p:animEffect>
+                                  </p:childTnLst>
+                                </p:cTn>
+                              </p:par>
+                            </p:childTnLst>
+                          </p:cTn>
+                        </p:par>
+                      </p:childTnLst>
+                    </p:cTn>
+                  </p:par>
+                  <p:par>
+                    <p:cTn id="18" fill="hold">
+                      <p:stCondLst>
+                        <p:cond delay="indefinite"/>
+                      </p:stCondLst>
+                      <p:childTnLst>
+                        <p:par>
+                          <p:cTn id="19" fill="hold">
+                            <p:stCondLst>
+                              <p:cond delay="0"/>
+                            </p:stCondLst>
+                            <p:childTnLst>
+                              <p:par>
+                                <p:cTn id="20" presetID="9" presetClass="exit" presetSubtype="0" fill="hold" grpId="1" nodeType="clickEffect">
+                                  <p:stCondLst>
+                                    <p:cond delay="0"/>
+                                  </p:stCondLst>
+                                  <p:childTnLst>
+                                    <p:animEffect transition="out" filter="dissolve">
+                                      <p:cBhvr>
+                                        <p:cTn id="21" dur="500"/>
+                                        <p:tgtEl>
+                                          <p:spTgt spid="66">
+                                            <p:txEl>
+                                              <p:pRg st="0" end="0"/>
+                                            </p:txEl>
+                                          </p:spTgt>
+                                        </p:tgtEl>
+                                      </p:cBhvr>
+                                    </p:animEffect>
+                                    <p:set>
+                                      <p:cBhvr>
+                                        <p:cTn id="22" dur="1" fill="hold">
+                                          <p:stCondLst>
+                                            <p:cond delay="499"/>
+                                          </p:stCondLst>
+                                        </p:cTn>
+                                        <p:tgtEl>
+                                          <p:spTgt spid="66">
+                                            <p:txEl>
+                                              <p:pRg st="0" end="0"/>
+                                            </p:txEl>
+                                          </p:spTgt>
+                                        </p:tgtEl>
+                                        <p:attrNameLst>
+                                          <p:attrName>style.visibility</p:attrName>
+                                        </p:attrNameLst>
+                                      </p:cBhvr>
+                                      <p:to>
+                                        <p:strVal val="hidden"/>
+                                      </p:to>
+                                    </p:set>
+                                  </p:childTnLst>
+                                </p:cTn>
+                              </p:par>
+                            </p:childTnLst>
+                          </p:cTn>
+                        </p:par>
+                      </p:childTnLst>
+                    </p:cTn>
+                  </p:par>
+                  <p:par>
+                    <p:cTn id="23" fill="hold">
+                      <p:stCondLst>
+                        <p:cond delay="indefinite"/>
+                      </p:stCondLst>
+                      <p:childTnLst>
+                        <p:par>
+                          <p:cTn id="24" fill="hold">
+                            <p:stCondLst>
+                              <p:cond delay="0"/>
+                            </p:stCondLst>
+                            <p:childTnLst>
+                              <p:par>
+                                <p:cTn id="25" presetID="9" presetClass="exit" presetSubtype="0" fill="hold" grpId="1" nodeType="clickEffect">
+                                  <p:stCondLst>
+                                    <p:cond delay="0"/>
+                                  </p:stCondLst>
+                                  <p:childTnLst>
+                                    <p:animEffect transition="out" filter="dissolve">
+                                      <p:cBhvr>
+                                        <p:cTn id="26" dur="500"/>
+                                        <p:tgtEl>
+                                          <p:spTgt spid="66">
+                                            <p:txEl>
+                                              <p:pRg st="1" end="1"/>
+                                            </p:txEl>
+                                          </p:spTgt>
+                                        </p:tgtEl>
+                                      </p:cBhvr>
+                                    </p:animEffect>
+                                    <p:set>
+                                      <p:cBhvr>
+                                        <p:cTn id="27" dur="1" fill="hold">
+                                          <p:stCondLst>
+                                            <p:cond delay="499"/>
+                                          </p:stCondLst>
+                                        </p:cTn>
+                                        <p:tgtEl>
+                                          <p:spTgt spid="66">
+                                            <p:txEl>
+                                              <p:pRg st="1" end="1"/>
+                                            </p:txEl>
+                                          </p:spTgt>
+                                        </p:tgtEl>
+                                        <p:attrNameLst>
+                                          <p:attrName>style.visibility</p:attrName>
+                                        </p:attrNameLst>
+                                      </p:cBhvr>
+                                      <p:to>
+                                        <p:strVal val="hidden"/>
+                                      </p:to>
+                                    </p:set>
+                                  </p:childTnLst>
+                                </p:cTn>
+                              </p:par>
+                            </p:childTnLst>
+                          </p:cTn>
+                        </p:par>
+                      </p:childTnLst>
+                    </p:cTn>
+                  </p:par>
+                  <p:par>
+                    <p:cTn id="28" fill="hold">
+                      <p:stCondLst>
+                        <p:cond delay="indefinite"/>
+                      </p:stCondLst>
+                      <p:childTnLst>
+                        <p:par>
+                          <p:cTn id="29" fill="hold">
+                            <p:stCondLst>
+                              <p:cond delay="0"/>
+                            </p:stCondLst>
+                            <p:childTnLst>
+                              <p:par>
+                                <p:cTn id="30" presetID="9" presetClass="exit" presetSubtype="0" fill="hold" grpId="1" nodeType="clickEffect">
+                                  <p:stCondLst>
+                                    <p:cond delay="0"/>
+                                  </p:stCondLst>
+                                  <p:childTnLst>
+                                    <p:animEffect transition="out" filter="dissolve">
+                                      <p:cBhvr>
+                                        <p:cTn id="31" dur="500"/>
+                                        <p:tgtEl>
+                                          <p:spTgt spid="66">
+                                            <p:txEl>
+                                              <p:pRg st="2" end="2"/>
+                                            </p:txEl>
+                                          </p:spTgt>
+                                        </p:tgtEl>
+                                      </p:cBhvr>
+                                    </p:animEffect>
+                                    <p:set>
+                                      <p:cBhvr>
+                                        <p:cTn id="32" dur="1" fill="hold">
+                                          <p:stCondLst>
+                                            <p:cond delay="499"/>
+                                          </p:stCondLst>
+                                        </p:cTn>
+                                        <p:tgtEl>
+                                          <p:spTgt spid="66">
+                                            <p:txEl>
+                                              <p:pRg st="2" end="2"/>
+                                            </p:txEl>
+                                          </p:spTgt>
+                                        </p:tgtEl>
+                                        <p:attrNameLst>
+                                          <p:attrName>style.visibility</p:attrName>
+                                        </p:attrNameLst>
+                                      </p:cBhvr>
+                                      <p:to>
+                                        <p:strVal val="hidden"/>
+                                      </p:to>
+                                    </p:set>
+                                  </p:childTnLst>
+                                </p:cTn>
+                              </p:par>
+                            </p:childTnLst>
+                          </p:cTn>
+                        </p:par>
+                      </p:childTnLst>
+                    </p:cTn>
+                  </p:par>
+                </p:childTnLst>
+              </p:cTn>
+              <p:prevCondLst>
+                <p:cond evt="onPrev" delay="0">
+                  <p:tgtEl>
+                    <p:sldTgt/>
+                  </p:tgtEl>
+                </p:cond>
+              </p:prevCondLst>
+              <p:nextCondLst>
+                <p:cond evt="onNext" delay="0">
+                  <p:tgtEl>
+                    <p:sldTgt/>
+                  </p:tgtEl>
+                </p:cond>
+              </p:nextCondLst>
+            </p:seq>
+          </p:childTnLst>
+        </p:cTn>
+      </p:par>
+    </p:tnLst>
+    <p:bldLst>
+      <p:bldP spid="66" grpId="0" uiExpand="1" build="p"/>
+      <p:bldP spid="66" grpId="1" uiExpand="1" build="p"/>
+    </p:bldLst>
+  </p:timing>
+</p:sld>
+</file>
+
+<file path=ppt/slides/slide21.xml><?xml version="1.0" encoding="utf-8"?>
+<p:sld xmlns:a="http://schemas.openxmlformats.org/drawingml/2006/main" xmlns:r="http://schemas.openxmlformats.org/officeDocument/2006/relationships" xmlns:p="http://schemas.openxmlformats.org/presentationml/2006/main">
+  <p:cSld>
+    <p:spTree>
+      <p:nvGrpSpPr>
+        <p:cNvPr id="1" name=""/>
+        <p:cNvGrpSpPr/>
+        <p:nvPr/>
+      </p:nvGrpSpPr>
+      <p:grpSpPr>
+        <a:xfrm>
+          <a:off x="0" y="0"/>
+          <a:ext cx="0" cy="0"/>
+          <a:chOff x="0" y="0"/>
+          <a:chExt cx="0" cy="0"/>
+        </a:xfrm>
+      </p:grpSpPr>
+      <p:sp>
+        <p:nvSpPr>
           <p:cNvPr id="9" name="Title 8">
             <a:extLst>
               <a:ext uri="{FF2B5EF4-FFF2-40B4-BE49-F238E27FC236}">
@@ -14977,7 +16115,7 @@
           <a:p>
             <a:fld id="{2183B7EE-0FBE-B749-875F-ED24F5ECD71F}" type="slidenum">
               <a:rPr lang="en-US" smtClean="0"/>
-              <a:t>20</a:t>
+              <a:t>21</a:t>
             </a:fld>
             <a:endParaRPr lang="en-US" dirty="0"/>
           </a:p>
@@ -16728,6 +17866,46 @@
           </a:prstGeom>
         </p:spPr>
       </p:pic>
+      <p:sp>
+        <p:nvSpPr>
+          <p:cNvPr id="5" name="TextBox 4">
+            <a:extLst>
+              <a:ext uri="{FF2B5EF4-FFF2-40B4-BE49-F238E27FC236}">
+                <a16:creationId xmlns:a16="http://schemas.microsoft.com/office/drawing/2014/main" id="{2D5D2859-729D-9343-B3D4-98D452EA0303}"/>
+              </a:ext>
+            </a:extLst>
+          </p:cNvPr>
+          <p:cNvSpPr txBox="1"/>
+          <p:nvPr/>
+        </p:nvSpPr>
+        <p:spPr>
+          <a:xfrm>
+            <a:off x="3466531" y="4117512"/>
+            <a:ext cx="5719836" cy="369332"/>
+          </a:xfrm>
+          <a:prstGeom prst="rect">
+            <a:avLst/>
+          </a:prstGeom>
+          <a:noFill/>
+        </p:spPr>
+        <p:txBody>
+          <a:bodyPr wrap="none" rtlCol="0">
+            <a:spAutoFit/>
+          </a:bodyPr>
+          <a:lstStyle/>
+          <a:p>
+            <a:r>
+              <a:rPr lang="pt-BR" b="1" dirty="0"/>
+              <a:t>Comparação entre mensagem XMPP e </a:t>
+            </a:r>
+            <a:r>
+              <a:rPr lang="pt-BR" b="1" dirty="0" err="1"/>
+              <a:t>FunXMPP</a:t>
+            </a:r>
+            <a:endParaRPr lang="pt-BR" b="1" dirty="0"/>
+          </a:p>
+        </p:txBody>
+      </p:sp>
     </p:spTree>
     <p:extLst>
       <p:ext uri="{BB962C8B-B14F-4D97-AF65-F5344CB8AC3E}">
@@ -17056,10 +18234,14 @@
           <a:lstStyle/>
           <a:p>
             <a:r>
-              <a:rPr lang="pt-BR" b="1" i="1" dirty="0"/>
-              <a:t>XMPP: Histórico e Uso</a:t>
-            </a:r>
-            <a:endParaRPr lang="pt-BR" dirty="0"/>
+              <a:rPr lang="pt-BR" b="1" i="1" cap="none" dirty="0"/>
+              <a:t>WhatsApp </a:t>
+            </a:r>
+            <a:r>
+              <a:rPr lang="pt-BR" b="1" i="1" cap="none" dirty="0" err="1"/>
+              <a:t>FunXMPP</a:t>
+            </a:r>
+            <a:endParaRPr lang="pt-BR" cap="none" dirty="0"/>
           </a:p>
         </p:txBody>
       </p:sp>
@@ -17504,8 +18686,12 @@
           <a:lstStyle/>
           <a:p>
             <a:r>
-              <a:rPr lang="pt-BR" b="1" i="1" dirty="0"/>
-              <a:t>XMPP: Histórico e Uso</a:t>
+              <a:rPr lang="pt-BR" b="1" i="1" cap="none" dirty="0"/>
+              <a:t>WhatsApp </a:t>
+            </a:r>
+            <a:r>
+              <a:rPr lang="pt-BR" b="1" i="1" cap="none" dirty="0" err="1"/>
+              <a:t>FunXMPP</a:t>
             </a:r>
             <a:endParaRPr lang="pt-BR" dirty="0"/>
           </a:p>

</xml_diff>